<commit_message>
improvement of storage efficiency label
</commit_message>
<xml_diff>
--- a/raid-leo.pptx
+++ b/raid-leo.pptx
@@ -249,7 +249,7 @@
             <a:pPr rtl="0"/>
             <a:fld id="{F3BE6B39-A503-4F12-B82D-73C2E66EF594}" type="datetime1">
               <a:rPr lang="de-DE" smtClean="0"/>
-              <a:t>11.12.23</a:t>
+              <a:t>08.01.24</a:t>
             </a:fld>
             <a:endParaRPr lang="de-DE"/>
           </a:p>
@@ -431,7 +431,7 @@
             <a:fld id="{DF7D5A72-39BD-435D-AC92-8B45D0113318}" type="datetime1">
               <a:rPr lang="de-DE" smtClean="0"/>
               <a:pPr/>
-              <a:t>11.12.23</a:t>
+              <a:t>08.01.24</a:t>
             </a:fld>
             <a:endParaRPr lang="de-DE" dirty="0"/>
           </a:p>
@@ -17916,7 +17916,7 @@
         <p:spPr>
           <a:xfrm>
             <a:off x="7161955" y="5517066"/>
-            <a:ext cx="2646878" cy="369332"/>
+            <a:ext cx="3151247" cy="369332"/>
           </a:xfrm>
           <a:prstGeom prst="rect">
             <a:avLst/>
@@ -17938,7 +17938,7 @@
                   </a:schemeClr>
                 </a:solidFill>
               </a:rPr>
-              <a:t>? % Speicherplatzeffizenz</a:t>
+              <a:t>N-1/N % Speicherplatzeffizenz</a:t>
             </a:r>
           </a:p>
         </p:txBody>
@@ -19825,6 +19825,15 @@
 </file>
 
 <file path=customXml/item1.xml><?xml version="1.0" encoding="utf-8"?>
+<?mso-contentType ?>
+<FormTemplates xmlns="http://schemas.microsoft.com/sharepoint/v3/contenttype/forms">
+  <Display>DocumentLibraryForm</Display>
+  <Edit>DocumentLibraryForm</Edit>
+  <New>DocumentLibraryForm</New>
+</FormTemplates>
+</file>
+
+<file path=customXml/item2.xml><?xml version="1.0" encoding="utf-8"?>
 <ct:contentTypeSchema xmlns:ct="http://schemas.microsoft.com/office/2006/metadata/contentType" xmlns:ma="http://schemas.microsoft.com/office/2006/metadata/properties/metaAttributes" ct:_="" ma:_="" ma:contentTypeName="Document" ma:contentTypeID="0x01010079F111ED35F8CC479449609E8A0923A6" ma:contentTypeVersion="20" ma:contentTypeDescription="Create a new document." ma:contentTypeScope="" ma:versionID="1267097ee5f5874adfcc408041ae252e">
   <xsd:schema xmlns:xsd="http://www.w3.org/2001/XMLSchema" xmlns:xs="http://www.w3.org/2001/XMLSchema" xmlns:p="http://schemas.microsoft.com/office/2006/metadata/properties" xmlns:ns1="http://schemas.microsoft.com/sharepoint/v3" xmlns:ns2="71af3243-3dd4-4a8d-8c0d-dd76da1f02a5" xmlns:ns3="16c05727-aa75-4e4a-9b5f-8a80a1165891" xmlns:ns4="230e9df3-be65-4c73-a93b-d1236ebd677e" targetNamespace="http://schemas.microsoft.com/office/2006/metadata/properties" ma:root="true" ma:fieldsID="395891a93df65b14727750f2c06c306c" ns1:_="" ns2:_="" ns3:_="" ns4:_="">
     <xsd:import namespace="http://schemas.microsoft.com/sharepoint/v3"/>
@@ -20100,15 +20109,6 @@
 </ct:contentTypeSchema>
 </file>
 
-<file path=customXml/item2.xml><?xml version="1.0" encoding="utf-8"?>
-<?mso-contentType ?>
-<FormTemplates xmlns="http://schemas.microsoft.com/sharepoint/v3/contenttype/forms">
-  <Display>DocumentLibraryForm</Display>
-  <Edit>DocumentLibraryForm</Edit>
-  <New>DocumentLibraryForm</New>
-</FormTemplates>
-</file>
-
 <file path=customXml/item3.xml><?xml version="1.0" encoding="utf-8"?>
 <p:properties xmlns:p="http://schemas.microsoft.com/office/2006/metadata/properties" xmlns:xsi="http://www.w3.org/2001/XMLSchema-instance" xmlns:pc="http://schemas.microsoft.com/office/infopath/2007/PartnerControls">
   <documentManagement>
@@ -20129,6 +20129,14 @@
 </file>
 
 <file path=customXml/itemProps1.xml><?xml version="1.0" encoding="utf-8"?>
+<ds:datastoreItem xmlns:ds="http://schemas.openxmlformats.org/officeDocument/2006/customXml" ds:itemID="{2D446390-8521-40A2-A462-EA068123BED9}">
+  <ds:schemaRefs>
+    <ds:schemaRef ds:uri="http://schemas.microsoft.com/sharepoint/v3/contenttype/forms"/>
+  </ds:schemaRefs>
+</ds:datastoreItem>
+</file>
+
+<file path=customXml/itemProps2.xml><?xml version="1.0" encoding="utf-8"?>
 <ds:datastoreItem xmlns:ds="http://schemas.openxmlformats.org/officeDocument/2006/customXml" ds:itemID="{01E84A1C-2814-43A7-9448-348326113A45}">
   <ds:schemaRefs>
     <ds:schemaRef ds:uri="http://schemas.microsoft.com/office/2006/metadata/contentType"/>
@@ -20145,14 +20153,6 @@
     <ds:schemaRef ds:uri="http://purl.org/dc/elements/1.1/"/>
     <ds:schemaRef ds:uri="http://purl.org/dc/terms/"/>
     <ds:schemaRef ds:uri="http://schemas.microsoft.com/internal/obd"/>
-  </ds:schemaRefs>
-</ds:datastoreItem>
-</file>
-
-<file path=customXml/itemProps2.xml><?xml version="1.0" encoding="utf-8"?>
-<ds:datastoreItem xmlns:ds="http://schemas.openxmlformats.org/officeDocument/2006/customXml" ds:itemID="{2D446390-8521-40A2-A462-EA068123BED9}">
-  <ds:schemaRefs>
-    <ds:schemaRef ds:uri="http://schemas.microsoft.com/sharepoint/v3/contenttype/forms"/>
   </ds:schemaRefs>
 </ds:datastoreItem>
 </file>

</xml_diff>